<commit_message>
add grading template for assignment05
</commit_message>
<xml_diff>
--- a/spring20/assignment05/assignment05 - Part 1.pptx
+++ b/spring20/assignment05/assignment05 - Part 1.pptx
@@ -368,7 +368,7 @@
           <a:p>
             <a:fld id="{15852C32-BF6D-42C7-AA17-01587176C3BE}" type="datetimeFigureOut">
               <a:rPr lang="en-US" smtClean="0"/>
-              <a:t>3/26/2020</a:t>
+              <a:t>3/31/2020</a:t>
             </a:fld>
             <a:endParaRPr lang="en-US"/>
           </a:p>
@@ -576,7 +576,7 @@
           <a:p>
             <a:fld id="{15852C32-BF6D-42C7-AA17-01587176C3BE}" type="datetimeFigureOut">
               <a:rPr lang="en-US" smtClean="0"/>
-              <a:t>3/26/2020</a:t>
+              <a:t>3/31/2020</a:t>
             </a:fld>
             <a:endParaRPr lang="en-US"/>
           </a:p>
@@ -832,7 +832,7 @@
           <a:p>
             <a:fld id="{15852C32-BF6D-42C7-AA17-01587176C3BE}" type="datetimeFigureOut">
               <a:rPr lang="en-US" smtClean="0"/>
-              <a:t>3/26/2020</a:t>
+              <a:t>3/31/2020</a:t>
             </a:fld>
             <a:endParaRPr lang="en-US"/>
           </a:p>
@@ -1002,7 +1002,7 @@
           <a:p>
             <a:fld id="{15852C32-BF6D-42C7-AA17-01587176C3BE}" type="datetimeFigureOut">
               <a:rPr lang="en-US" smtClean="0"/>
-              <a:t>3/26/2020</a:t>
+              <a:t>3/31/2020</a:t>
             </a:fld>
             <a:endParaRPr lang="en-US"/>
           </a:p>
@@ -1345,7 +1345,7 @@
           <a:p>
             <a:fld id="{15852C32-BF6D-42C7-AA17-01587176C3BE}" type="datetimeFigureOut">
               <a:rPr lang="en-US" smtClean="0"/>
-              <a:t>3/26/2020</a:t>
+              <a:t>3/31/2020</a:t>
             </a:fld>
             <a:endParaRPr lang="en-US"/>
           </a:p>
@@ -1620,7 +1620,7 @@
           <a:p>
             <a:fld id="{15852C32-BF6D-42C7-AA17-01587176C3BE}" type="datetimeFigureOut">
               <a:rPr lang="en-US" smtClean="0"/>
-              <a:t>3/26/2020</a:t>
+              <a:t>3/31/2020</a:t>
             </a:fld>
             <a:endParaRPr lang="en-US"/>
           </a:p>
@@ -1999,7 +1999,7 @@
           <a:p>
             <a:fld id="{15852C32-BF6D-42C7-AA17-01587176C3BE}" type="datetimeFigureOut">
               <a:rPr lang="en-US" smtClean="0"/>
-              <a:t>3/26/2020</a:t>
+              <a:t>3/31/2020</a:t>
             </a:fld>
             <a:endParaRPr lang="en-US"/>
           </a:p>
@@ -2117,7 +2117,7 @@
           <a:p>
             <a:fld id="{15852C32-BF6D-42C7-AA17-01587176C3BE}" type="datetimeFigureOut">
               <a:rPr lang="en-US" smtClean="0"/>
-              <a:t>3/26/2020</a:t>
+              <a:t>3/31/2020</a:t>
             </a:fld>
             <a:endParaRPr lang="en-US"/>
           </a:p>
@@ -2288,7 +2288,7 @@
           <a:p>
             <a:fld id="{15852C32-BF6D-42C7-AA17-01587176C3BE}" type="datetimeFigureOut">
               <a:rPr lang="en-US" smtClean="0"/>
-              <a:t>3/26/2020</a:t>
+              <a:t>3/31/2020</a:t>
             </a:fld>
             <a:endParaRPr lang="en-US"/>
           </a:p>
@@ -2642,7 +2642,7 @@
           <a:p>
             <a:fld id="{15852C32-BF6D-42C7-AA17-01587176C3BE}" type="datetimeFigureOut">
               <a:rPr lang="en-US" smtClean="0"/>
-              <a:t>3/26/2020</a:t>
+              <a:t>3/31/2020</a:t>
             </a:fld>
             <a:endParaRPr lang="en-US"/>
           </a:p>
@@ -3019,7 +3019,7 @@
           <a:p>
             <a:fld id="{15852C32-BF6D-42C7-AA17-01587176C3BE}" type="datetimeFigureOut">
               <a:rPr lang="en-US" smtClean="0"/>
-              <a:t>3/26/2020</a:t>
+              <a:t>3/31/2020</a:t>
             </a:fld>
             <a:endParaRPr lang="en-US"/>
           </a:p>
@@ -3306,7 +3306,7 @@
           <a:p>
             <a:fld id="{15852C32-BF6D-42C7-AA17-01587176C3BE}" type="datetimeFigureOut">
               <a:rPr lang="en-US" smtClean="0"/>
-              <a:t>3/26/2020</a:t>
+              <a:t>3/31/2020</a:t>
             </a:fld>
             <a:endParaRPr lang="en-US"/>
           </a:p>
@@ -15985,7 +15985,13 @@
           <p:cNvGraphicFramePr>
             <a:graphicFrameLocks noGrp="1"/>
           </p:cNvGraphicFramePr>
-          <p:nvPr/>
+          <p:nvPr>
+            <p:extLst>
+              <p:ext uri="{D42A27DB-BD31-4B8C-83A1-F6EECF244321}">
+                <p14:modId xmlns:p14="http://schemas.microsoft.com/office/powerpoint/2010/main" val="1418752579"/>
+              </p:ext>
+            </p:extLst>
+          </p:nvPr>
         </p:nvGraphicFramePr>
         <p:xfrm>
           <a:off x="5596199" y="2183971"/>
@@ -16481,7 +16487,7 @@
                         <a:rPr lang="en-US" sz="1000" dirty="0">
                           <a:latin typeface="Consolas" panose="020B0609020204030204" pitchFamily="49" charset="0"/>
                         </a:rPr>
-                        <a:t>2(3.25)</a:t>
+                        <a:t>-2(3.25)</a:t>
                       </a:r>
                       <a:r>
                         <a:rPr lang="en-US" sz="1000" baseline="30000" dirty="0">

</xml_diff>